<commit_message>
progress report 1 commit
</commit_message>
<xml_diff>
--- a/progressreport1.pptx
+++ b/progressreport1.pptx
@@ -1,6 +1,6 @@
 
 <file path=ppt/presentation.xml><?xml version="1.0" encoding="utf-8"?>
-<p:presentation xmlns:a="http://schemas.openxmlformats.org/drawingml/2006/main" xmlns:r="http://schemas.openxmlformats.org/officeDocument/2006/relationships" xmlns:p="http://schemas.openxmlformats.org/presentationml/2006/main" saveSubsetFonts="1" autoCompressPictures="0">
+<p:presentation xmlns:a="http://schemas.openxmlformats.org/drawingml/2006/main" xmlns:r="http://schemas.openxmlformats.org/officeDocument/2006/relationships" xmlns:mc="http://schemas.openxmlformats.org/markup-compatibility/2006" xmlns:mv="urn:schemas-microsoft-com:mac:vml" xmlns:p="http://schemas.openxmlformats.org/presentationml/2006/main" mc:Ignorable="mv" mc:PreserveAttributes="mv:*" saveSubsetFonts="1" autoCompressPictures="0">
   <p:sldMasterIdLst>
     <p:sldMasterId id="2147483660" r:id="rId1"/>
   </p:sldMasterIdLst>
@@ -112,7 +112,7 @@
 </file>
 
 <file path=ppt/slideLayouts/slideLayout1.xml><?xml version="1.0" encoding="utf-8"?>
-<p:sldLayout xmlns:a="http://schemas.openxmlformats.org/drawingml/2006/main" xmlns:r="http://schemas.openxmlformats.org/officeDocument/2006/relationships" xmlns:p="http://schemas.openxmlformats.org/presentationml/2006/main" showMasterSp="0" type="title" preserve="1">
+<p:sldLayout xmlns:a="http://schemas.openxmlformats.org/drawingml/2006/main" xmlns:r="http://schemas.openxmlformats.org/officeDocument/2006/relationships" xmlns:mc="http://schemas.openxmlformats.org/markup-compatibility/2006" xmlns:mv="urn:schemas-microsoft-com:mac:vml" xmlns:p="http://schemas.openxmlformats.org/presentationml/2006/main" mc:Ignorable="mv" mc:PreserveAttributes="mv:*" showMasterSp="0" type="title" preserve="1">
   <p:cSld name="Title Slide">
     <p:spTree>
       <p:nvGrpSpPr>
@@ -1923,7 +1923,8 @@
           <a:p>
             <a:fld id="{692E78E7-E14F-6D4A-85BE-5D4C1A674C88}" type="datetimeFigureOut">
               <a:rPr lang="en-US" smtClean="0"/>
-              <a:t>4/13/16</a:t>
+              <a:pPr/>
+              <a:t>4/14/16</a:t>
             </a:fld>
             <a:endParaRPr lang="en-US"/>
           </a:p>
@@ -1965,6 +1966,7 @@
           <a:p>
             <a:fld id="{875080A6-0AA7-2244-879E-50F028428DA2}" type="slidenum">
               <a:rPr lang="en-US" smtClean="0"/>
+              <a:pPr/>
               <a:t>‹#›</a:t>
             </a:fld>
             <a:endParaRPr lang="en-US"/>
@@ -1980,7 +1982,7 @@
 </file>
 
 <file path=ppt/slideLayouts/slideLayout10.xml><?xml version="1.0" encoding="utf-8"?>
-<p:sldLayout xmlns:a="http://schemas.openxmlformats.org/drawingml/2006/main" xmlns:r="http://schemas.openxmlformats.org/officeDocument/2006/relationships" xmlns:p="http://schemas.openxmlformats.org/presentationml/2006/main" type="vertTx" preserve="1">
+<p:sldLayout xmlns:a="http://schemas.openxmlformats.org/drawingml/2006/main" xmlns:r="http://schemas.openxmlformats.org/officeDocument/2006/relationships" xmlns:mc="http://schemas.openxmlformats.org/markup-compatibility/2006" xmlns:mv="urn:schemas-microsoft-com:mac:vml" xmlns:p="http://schemas.openxmlformats.org/presentationml/2006/main" mc:Ignorable="mv" mc:PreserveAttributes="mv:*" type="vertTx" preserve="1">
   <p:cSld name="Title and Vertical Text">
     <p:spTree>
       <p:nvGrpSpPr>
@@ -2104,7 +2106,8 @@
           <a:p>
             <a:fld id="{692E78E7-E14F-6D4A-85BE-5D4C1A674C88}" type="datetimeFigureOut">
               <a:rPr lang="en-US" smtClean="0"/>
-              <a:t>4/13/16</a:t>
+              <a:pPr/>
+              <a:t>4/14/16</a:t>
             </a:fld>
             <a:endParaRPr lang="en-US"/>
           </a:p>
@@ -2146,6 +2149,7 @@
           <a:p>
             <a:fld id="{875080A6-0AA7-2244-879E-50F028428DA2}" type="slidenum">
               <a:rPr lang="en-US" smtClean="0"/>
+              <a:pPr/>
               <a:t>‹#›</a:t>
             </a:fld>
             <a:endParaRPr lang="en-US"/>
@@ -2161,7 +2165,7 @@
 </file>
 
 <file path=ppt/slideLayouts/slideLayout11.xml><?xml version="1.0" encoding="utf-8"?>
-<p:sldLayout xmlns:a="http://schemas.openxmlformats.org/drawingml/2006/main" xmlns:r="http://schemas.openxmlformats.org/officeDocument/2006/relationships" xmlns:p="http://schemas.openxmlformats.org/presentationml/2006/main" showMasterSp="0" type="vertTitleAndTx" preserve="1">
+<p:sldLayout xmlns:a="http://schemas.openxmlformats.org/drawingml/2006/main" xmlns:r="http://schemas.openxmlformats.org/officeDocument/2006/relationships" xmlns:mc="http://schemas.openxmlformats.org/markup-compatibility/2006" xmlns:mv="urn:schemas-microsoft-com:mac:vml" xmlns:p="http://schemas.openxmlformats.org/presentationml/2006/main" mc:Ignorable="mv" mc:PreserveAttributes="mv:*" showMasterSp="0" type="vertTitleAndTx" preserve="1">
   <p:cSld name="Vertical Title and Text">
     <p:spTree>
       <p:nvGrpSpPr>
@@ -2255,7 +2259,8 @@
           <a:p>
             <a:fld id="{692E78E7-E14F-6D4A-85BE-5D4C1A674C88}" type="datetimeFigureOut">
               <a:rPr lang="en-US" smtClean="0"/>
-              <a:t>4/13/16</a:t>
+              <a:pPr/>
+              <a:t>4/14/16</a:t>
             </a:fld>
             <a:endParaRPr lang="en-US"/>
           </a:p>
@@ -2297,6 +2302,7 @@
           <a:p>
             <a:fld id="{875080A6-0AA7-2244-879E-50F028428DA2}" type="slidenum">
               <a:rPr lang="en-US" smtClean="0"/>
+              <a:pPr/>
               <a:t>‹#›</a:t>
             </a:fld>
             <a:endParaRPr lang="en-US"/>
@@ -3996,7 +4002,7 @@
 </file>
 
 <file path=ppt/slideLayouts/slideLayout2.xml><?xml version="1.0" encoding="utf-8"?>
-<p:sldLayout xmlns:a="http://schemas.openxmlformats.org/drawingml/2006/main" xmlns:r="http://schemas.openxmlformats.org/officeDocument/2006/relationships" xmlns:p="http://schemas.openxmlformats.org/presentationml/2006/main" type="obj" preserve="1">
+<p:sldLayout xmlns:a="http://schemas.openxmlformats.org/drawingml/2006/main" xmlns:r="http://schemas.openxmlformats.org/officeDocument/2006/relationships" xmlns:mc="http://schemas.openxmlformats.org/markup-compatibility/2006" xmlns:mv="urn:schemas-microsoft-com:mac:vml" xmlns:p="http://schemas.openxmlformats.org/presentationml/2006/main" mc:Ignorable="mv" mc:PreserveAttributes="mv:*" type="obj" preserve="1">
   <p:cSld name="Title and Content">
     <p:spTree>
       <p:nvGrpSpPr>
@@ -4081,7 +4087,8 @@
           <a:p>
             <a:fld id="{692E78E7-E14F-6D4A-85BE-5D4C1A674C88}" type="datetimeFigureOut">
               <a:rPr lang="en-US" smtClean="0"/>
-              <a:t>4/13/16</a:t>
+              <a:pPr/>
+              <a:t>4/14/16</a:t>
             </a:fld>
             <a:endParaRPr lang="en-US"/>
           </a:p>
@@ -4123,6 +4130,7 @@
           <a:p>
             <a:fld id="{875080A6-0AA7-2244-879E-50F028428DA2}" type="slidenum">
               <a:rPr lang="en-US" smtClean="0"/>
+              <a:pPr/>
               <a:t>‹#›</a:t>
             </a:fld>
             <a:endParaRPr lang="en-US"/>
@@ -4161,7 +4169,7 @@
 </file>
 
 <file path=ppt/slideLayouts/slideLayout3.xml><?xml version="1.0" encoding="utf-8"?>
-<p:sldLayout xmlns:a="http://schemas.openxmlformats.org/drawingml/2006/main" xmlns:r="http://schemas.openxmlformats.org/officeDocument/2006/relationships" xmlns:p="http://schemas.openxmlformats.org/presentationml/2006/main" showMasterSp="0" type="secHead" preserve="1">
+<p:sldLayout xmlns:a="http://schemas.openxmlformats.org/drawingml/2006/main" xmlns:r="http://schemas.openxmlformats.org/officeDocument/2006/relationships" xmlns:mc="http://schemas.openxmlformats.org/markup-compatibility/2006" xmlns:mv="urn:schemas-microsoft-com:mac:vml" xmlns:p="http://schemas.openxmlformats.org/presentationml/2006/main" mc:Ignorable="mv" mc:PreserveAttributes="mv:*" showMasterSp="0" type="secHead" preserve="1">
   <p:cSld name="Section Header">
     <p:spTree>
       <p:nvGrpSpPr>
@@ -5951,7 +5959,8 @@
           <a:p>
             <a:fld id="{692E78E7-E14F-6D4A-85BE-5D4C1A674C88}" type="datetimeFigureOut">
               <a:rPr lang="en-US" smtClean="0"/>
-              <a:t>4/13/16</a:t>
+              <a:pPr/>
+              <a:t>4/14/16</a:t>
             </a:fld>
             <a:endParaRPr lang="en-US"/>
           </a:p>
@@ -5993,6 +6002,7 @@
           <a:p>
             <a:fld id="{875080A6-0AA7-2244-879E-50F028428DA2}" type="slidenum">
               <a:rPr lang="en-US" smtClean="0"/>
+              <a:pPr/>
               <a:t>‹#›</a:t>
             </a:fld>
             <a:endParaRPr lang="en-US"/>
@@ -6008,7 +6018,7 @@
 </file>
 
 <file path=ppt/slideLayouts/slideLayout4.xml><?xml version="1.0" encoding="utf-8"?>
-<p:sldLayout xmlns:a="http://schemas.openxmlformats.org/drawingml/2006/main" xmlns:r="http://schemas.openxmlformats.org/officeDocument/2006/relationships" xmlns:p="http://schemas.openxmlformats.org/presentationml/2006/main" type="twoObj" preserve="1">
+<p:sldLayout xmlns:a="http://schemas.openxmlformats.org/drawingml/2006/main" xmlns:r="http://schemas.openxmlformats.org/officeDocument/2006/relationships" xmlns:mc="http://schemas.openxmlformats.org/markup-compatibility/2006" xmlns:mv="urn:schemas-microsoft-com:mac:vml" xmlns:p="http://schemas.openxmlformats.org/presentationml/2006/main" mc:Ignorable="mv" mc:PreserveAttributes="mv:*" type="twoObj" preserve="1">
   <p:cSld name="Two Content">
     <p:spTree>
       <p:nvGrpSpPr>
@@ -6064,7 +6074,8 @@
           <a:p>
             <a:fld id="{692E78E7-E14F-6D4A-85BE-5D4C1A674C88}" type="datetimeFigureOut">
               <a:rPr lang="en-US" smtClean="0"/>
-              <a:t>4/13/16</a:t>
+              <a:pPr/>
+              <a:t>4/14/16</a:t>
             </a:fld>
             <a:endParaRPr lang="en-US"/>
           </a:p>
@@ -6106,6 +6117,7 @@
           <a:p>
             <a:fld id="{875080A6-0AA7-2244-879E-50F028428DA2}" type="slidenum">
               <a:rPr lang="en-US" smtClean="0"/>
+              <a:pPr/>
               <a:t>‹#›</a:t>
             </a:fld>
             <a:endParaRPr lang="en-US"/>
@@ -6235,7 +6247,7 @@
 </file>
 
 <file path=ppt/slideLayouts/slideLayout5.xml><?xml version="1.0" encoding="utf-8"?>
-<p:sldLayout xmlns:a="http://schemas.openxmlformats.org/drawingml/2006/main" xmlns:r="http://schemas.openxmlformats.org/officeDocument/2006/relationships" xmlns:p="http://schemas.openxmlformats.org/presentationml/2006/main" type="twoTxTwoObj" preserve="1">
+<p:sldLayout xmlns:a="http://schemas.openxmlformats.org/drawingml/2006/main" xmlns:r="http://schemas.openxmlformats.org/officeDocument/2006/relationships" xmlns:mc="http://schemas.openxmlformats.org/markup-compatibility/2006" xmlns:mv="urn:schemas-microsoft-com:mac:vml" xmlns:p="http://schemas.openxmlformats.org/presentationml/2006/main" mc:Ignorable="mv" mc:PreserveAttributes="mv:*" type="twoTxTwoObj" preserve="1">
   <p:cSld name="Comparison">
     <p:spTree>
       <p:nvGrpSpPr>
@@ -6605,7 +6617,8 @@
           <a:p>
             <a:fld id="{692E78E7-E14F-6D4A-85BE-5D4C1A674C88}" type="datetimeFigureOut">
               <a:rPr lang="en-US" smtClean="0"/>
-              <a:t>4/13/16</a:t>
+              <a:pPr/>
+              <a:t>4/14/16</a:t>
             </a:fld>
             <a:endParaRPr lang="en-US"/>
           </a:p>
@@ -6647,6 +6660,7 @@
           <a:p>
             <a:fld id="{875080A6-0AA7-2244-879E-50F028428DA2}" type="slidenum">
               <a:rPr lang="en-US" smtClean="0"/>
+              <a:pPr/>
               <a:t>‹#›</a:t>
             </a:fld>
             <a:endParaRPr lang="en-US"/>
@@ -6662,7 +6676,7 @@
 </file>
 
 <file path=ppt/slideLayouts/slideLayout6.xml><?xml version="1.0" encoding="utf-8"?>
-<p:sldLayout xmlns:a="http://schemas.openxmlformats.org/drawingml/2006/main" xmlns:r="http://schemas.openxmlformats.org/officeDocument/2006/relationships" xmlns:p="http://schemas.openxmlformats.org/presentationml/2006/main" type="titleOnly" preserve="1">
+<p:sldLayout xmlns:a="http://schemas.openxmlformats.org/drawingml/2006/main" xmlns:r="http://schemas.openxmlformats.org/officeDocument/2006/relationships" xmlns:mc="http://schemas.openxmlformats.org/markup-compatibility/2006" xmlns:mv="urn:schemas-microsoft-com:mac:vml" xmlns:p="http://schemas.openxmlformats.org/presentationml/2006/main" mc:Ignorable="mv" mc:PreserveAttributes="mv:*" type="titleOnly" preserve="1">
   <p:cSld name="Title Only">
     <p:spTree>
       <p:nvGrpSpPr>
@@ -6718,7 +6732,8 @@
           <a:p>
             <a:fld id="{692E78E7-E14F-6D4A-85BE-5D4C1A674C88}" type="datetimeFigureOut">
               <a:rPr lang="en-US" smtClean="0"/>
-              <a:t>4/13/16</a:t>
+              <a:pPr/>
+              <a:t>4/14/16</a:t>
             </a:fld>
             <a:endParaRPr lang="en-US"/>
           </a:p>
@@ -6760,6 +6775,7 @@
           <a:p>
             <a:fld id="{875080A6-0AA7-2244-879E-50F028428DA2}" type="slidenum">
               <a:rPr lang="en-US" smtClean="0"/>
+              <a:pPr/>
               <a:t>‹#›</a:t>
             </a:fld>
             <a:endParaRPr lang="en-US"/>
@@ -6775,7 +6791,7 @@
 </file>
 
 <file path=ppt/slideLayouts/slideLayout7.xml><?xml version="1.0" encoding="utf-8"?>
-<p:sldLayout xmlns:a="http://schemas.openxmlformats.org/drawingml/2006/main" xmlns:r="http://schemas.openxmlformats.org/officeDocument/2006/relationships" xmlns:p="http://schemas.openxmlformats.org/presentationml/2006/main" showMasterSp="0" type="blank" preserve="1">
+<p:sldLayout xmlns:a="http://schemas.openxmlformats.org/drawingml/2006/main" xmlns:r="http://schemas.openxmlformats.org/officeDocument/2006/relationships" xmlns:mc="http://schemas.openxmlformats.org/markup-compatibility/2006" xmlns:mv="urn:schemas-microsoft-com:mac:vml" xmlns:p="http://schemas.openxmlformats.org/presentationml/2006/main" mc:Ignorable="mv" mc:PreserveAttributes="mv:*" showMasterSp="0" type="blank" preserve="1">
   <p:cSld name="Blank">
     <p:spTree>
       <p:nvGrpSpPr>
@@ -8429,7 +8445,8 @@
           <a:p>
             <a:fld id="{692E78E7-E14F-6D4A-85BE-5D4C1A674C88}" type="datetimeFigureOut">
               <a:rPr lang="en-US" smtClean="0"/>
-              <a:t>4/13/16</a:t>
+              <a:pPr/>
+              <a:t>4/14/16</a:t>
             </a:fld>
             <a:endParaRPr lang="en-US"/>
           </a:p>
@@ -8471,6 +8488,7 @@
           <a:p>
             <a:fld id="{875080A6-0AA7-2244-879E-50F028428DA2}" type="slidenum">
               <a:rPr lang="en-US" smtClean="0"/>
+              <a:pPr/>
               <a:t>‹#›</a:t>
             </a:fld>
             <a:endParaRPr lang="en-US"/>
@@ -8486,7 +8504,7 @@
 </file>
 
 <file path=ppt/slideLayouts/slideLayout8.xml><?xml version="1.0" encoding="utf-8"?>
-<p:sldLayout xmlns:a="http://schemas.openxmlformats.org/drawingml/2006/main" xmlns:r="http://schemas.openxmlformats.org/officeDocument/2006/relationships" xmlns:p="http://schemas.openxmlformats.org/presentationml/2006/main" showMasterSp="0" type="objTx" preserve="1">
+<p:sldLayout xmlns:a="http://schemas.openxmlformats.org/drawingml/2006/main" xmlns:r="http://schemas.openxmlformats.org/officeDocument/2006/relationships" xmlns:mc="http://schemas.openxmlformats.org/markup-compatibility/2006" xmlns:mv="urn:schemas-microsoft-com:mac:vml" xmlns:p="http://schemas.openxmlformats.org/presentationml/2006/main" mc:Ignorable="mv" mc:PreserveAttributes="mv:*" showMasterSp="0" type="objTx" preserve="1">
   <p:cSld name="Content with Caption">
     <p:spTree>
       <p:nvGrpSpPr>
@@ -8580,7 +8598,8 @@
           <a:p>
             <a:fld id="{692E78E7-E14F-6D4A-85BE-5D4C1A674C88}" type="datetimeFigureOut">
               <a:rPr lang="en-US" smtClean="0"/>
-              <a:t>4/13/16</a:t>
+              <a:pPr/>
+              <a:t>4/14/16</a:t>
             </a:fld>
             <a:endParaRPr lang="en-US"/>
           </a:p>
@@ -8622,6 +8641,7 @@
           <a:p>
             <a:fld id="{875080A6-0AA7-2244-879E-50F028428DA2}" type="slidenum">
               <a:rPr lang="en-US" smtClean="0"/>
+              <a:pPr/>
               <a:t>‹#›</a:t>
             </a:fld>
             <a:endParaRPr lang="en-US"/>
@@ -10432,7 +10452,7 @@
 </file>
 
 <file path=ppt/slideLayouts/slideLayout9.xml><?xml version="1.0" encoding="utf-8"?>
-<p:sldLayout xmlns:a="http://schemas.openxmlformats.org/drawingml/2006/main" xmlns:r="http://schemas.openxmlformats.org/officeDocument/2006/relationships" xmlns:p="http://schemas.openxmlformats.org/presentationml/2006/main" showMasterSp="0" type="picTx" preserve="1">
+<p:sldLayout xmlns:a="http://schemas.openxmlformats.org/drawingml/2006/main" xmlns:r="http://schemas.openxmlformats.org/officeDocument/2006/relationships" xmlns:mc="http://schemas.openxmlformats.org/markup-compatibility/2006" xmlns:mv="urn:schemas-microsoft-com:mac:vml" xmlns:p="http://schemas.openxmlformats.org/presentationml/2006/main" mc:Ignorable="mv" mc:PreserveAttributes="mv:*" showMasterSp="0" type="picTx" preserve="1">
   <p:cSld name="Picture with Caption">
     <p:spTree>
       <p:nvGrpSpPr>
@@ -12195,7 +12215,8 @@
           <a:p>
             <a:fld id="{692E78E7-E14F-6D4A-85BE-5D4C1A674C88}" type="datetimeFigureOut">
               <a:rPr lang="en-US" smtClean="0"/>
-              <a:t>4/13/16</a:t>
+              <a:pPr/>
+              <a:t>4/14/16</a:t>
             </a:fld>
             <a:endParaRPr lang="en-US"/>
           </a:p>
@@ -12237,6 +12258,7 @@
           <a:p>
             <a:fld id="{875080A6-0AA7-2244-879E-50F028428DA2}" type="slidenum">
               <a:rPr lang="en-US" smtClean="0"/>
+              <a:pPr/>
               <a:t>‹#›</a:t>
             </a:fld>
             <a:endParaRPr lang="en-US"/>
@@ -12346,7 +12368,7 @@
 </file>
 
 <file path=ppt/slideMasters/slideMaster1.xml><?xml version="1.0" encoding="utf-8"?>
-<p:sldMaster xmlns:a="http://schemas.openxmlformats.org/drawingml/2006/main" xmlns:r="http://schemas.openxmlformats.org/officeDocument/2006/relationships" xmlns:p="http://schemas.openxmlformats.org/presentationml/2006/main">
+<p:sldMaster xmlns:a="http://schemas.openxmlformats.org/drawingml/2006/main" xmlns:r="http://schemas.openxmlformats.org/officeDocument/2006/relationships" xmlns:mc="http://schemas.openxmlformats.org/markup-compatibility/2006" xmlns:mv="urn:schemas-microsoft-com:mac:vml" xmlns:p="http://schemas.openxmlformats.org/presentationml/2006/main" mc:Ignorable="mv" mc:PreserveAttributes="mv:*">
   <p:cSld>
     <p:bg>
       <p:bgRef idx="1001">
@@ -14054,7 +14076,8 @@
           <a:p>
             <a:fld id="{692E78E7-E14F-6D4A-85BE-5D4C1A674C88}" type="datetimeFigureOut">
               <a:rPr lang="en-US" smtClean="0"/>
-              <a:t>4/13/16</a:t>
+              <a:pPr/>
+              <a:t>4/14/16</a:t>
             </a:fld>
             <a:endParaRPr lang="en-US"/>
           </a:p>
@@ -14128,6 +14151,7 @@
           <a:p>
             <a:fld id="{875080A6-0AA7-2244-879E-50F028428DA2}" type="slidenum">
               <a:rPr lang="en-US" smtClean="0"/>
+              <a:pPr/>
               <a:t>‹#›</a:t>
             </a:fld>
             <a:endParaRPr lang="en-US"/>
@@ -14554,7 +14578,7 @@
 </file>
 
 <file path=ppt/slides/slide1.xml><?xml version="1.0" encoding="utf-8"?>
-<p:sld xmlns:a="http://schemas.openxmlformats.org/drawingml/2006/main" xmlns:r="http://schemas.openxmlformats.org/officeDocument/2006/relationships" xmlns:p="http://schemas.openxmlformats.org/presentationml/2006/main">
+<p:sld xmlns:a="http://schemas.openxmlformats.org/drawingml/2006/main" xmlns:r="http://schemas.openxmlformats.org/officeDocument/2006/relationships" xmlns:mc="http://schemas.openxmlformats.org/markup-compatibility/2006" xmlns:mv="urn:schemas-microsoft-com:mac:vml" xmlns:p="http://schemas.openxmlformats.org/presentationml/2006/main" mc:Ignorable="mv" mc:PreserveAttributes="mv:*">
   <p:cSld>
     <p:spTree>
       <p:nvGrpSpPr>
@@ -14638,11 +14662,7 @@
           <a:p>
             <a:r>
               <a:rPr lang="en-US" dirty="0" smtClean="0"/>
-              <a:t>Cassie </a:t>
-            </a:r>
-            <a:r>
-              <a:rPr lang="en-US" dirty="0" smtClean="0"/>
-              <a:t>Wes</a:t>
+              <a:t>Cassie Wes</a:t>
             </a:r>
             <a:endParaRPr lang="en-US" dirty="0"/>
           </a:p>
@@ -14651,7 +14671,7 @@
     </p:spTree>
     <p:extLst>
       <p:ext uri="{BB962C8B-B14F-4D97-AF65-F5344CB8AC3E}">
-        <p14:creationId xmlns:p14="http://schemas.microsoft.com/office/powerpoint/2010/main" val="3794310168"/>
+        <p14:creationId xmlns="" xmlns:a="http://schemas.openxmlformats.org/drawingml/2006/main" xmlns:r="http://schemas.openxmlformats.org/officeDocument/2006/relationships" xmlns:p="http://schemas.openxmlformats.org/presentationml/2006/main" xmlns:p14="http://schemas.microsoft.com/office/powerpoint/2010/main" xmlns:mv="urn:schemas-microsoft-com:mac:vml" xmlns:mc="http://schemas.openxmlformats.org/markup-compatibility/2006" val="3794310168"/>
       </p:ext>
     </p:extLst>
   </p:cSld>
@@ -14662,7 +14682,7 @@
 </file>
 
 <file path=ppt/slides/slide2.xml><?xml version="1.0" encoding="utf-8"?>
-<p:sld xmlns:a="http://schemas.openxmlformats.org/drawingml/2006/main" xmlns:r="http://schemas.openxmlformats.org/officeDocument/2006/relationships" xmlns:p="http://schemas.openxmlformats.org/presentationml/2006/main">
+<p:sld xmlns:a="http://schemas.openxmlformats.org/drawingml/2006/main" xmlns:r="http://schemas.openxmlformats.org/officeDocument/2006/relationships" xmlns:mc="http://schemas.openxmlformats.org/markup-compatibility/2006" xmlns:mv="urn:schemas-microsoft-com:mac:vml" xmlns:p="http://schemas.openxmlformats.org/presentationml/2006/main" mc:Ignorable="mv" mc:PreserveAttributes="mv:*">
   <p:cSld>
     <p:spTree>
       <p:nvGrpSpPr>
@@ -14703,7 +14723,6 @@
               <a:rPr lang="en-US" dirty="0" smtClean="0"/>
               <a:t>New additions </a:t>
             </a:r>
-            <a:endParaRPr lang="en-US" dirty="0" smtClean="0"/>
           </a:p>
           <a:p>
             <a:pPr lvl="1"/>
@@ -14711,7 +14730,6 @@
               <a:rPr lang="en-US" dirty="0" smtClean="0"/>
               <a:t>Virtual button to move bird up and down</a:t>
             </a:r>
-            <a:endParaRPr lang="en-US" dirty="0" smtClean="0"/>
           </a:p>
           <a:p>
             <a:pPr lvl="1"/>
@@ -14756,7 +14774,7 @@
     </p:spTree>
     <p:extLst>
       <p:ext uri="{BB962C8B-B14F-4D97-AF65-F5344CB8AC3E}">
-        <p14:creationId xmlns:p14="http://schemas.microsoft.com/office/powerpoint/2010/main" val="3568293640"/>
+        <p14:creationId xmlns="" xmlns:a="http://schemas.openxmlformats.org/drawingml/2006/main" xmlns:r="http://schemas.openxmlformats.org/officeDocument/2006/relationships" xmlns:p="http://schemas.openxmlformats.org/presentationml/2006/main" xmlns:p14="http://schemas.microsoft.com/office/powerpoint/2010/main" xmlns:mv="urn:schemas-microsoft-com:mac:vml" xmlns:mc="http://schemas.openxmlformats.org/markup-compatibility/2006" val="3568293640"/>
       </p:ext>
     </p:extLst>
   </p:cSld>
@@ -14767,7 +14785,7 @@
 </file>
 
 <file path=ppt/slides/slide3.xml><?xml version="1.0" encoding="utf-8"?>
-<p:sld xmlns:a="http://schemas.openxmlformats.org/drawingml/2006/main" xmlns:r="http://schemas.openxmlformats.org/officeDocument/2006/relationships" xmlns:p="http://schemas.openxmlformats.org/presentationml/2006/main">
+<p:sld xmlns:a="http://schemas.openxmlformats.org/drawingml/2006/main" xmlns:r="http://schemas.openxmlformats.org/officeDocument/2006/relationships" xmlns:mc="http://schemas.openxmlformats.org/markup-compatibility/2006" xmlns:mv="urn:schemas-microsoft-com:mac:vml" xmlns:p="http://schemas.openxmlformats.org/presentationml/2006/main" mc:Ignorable="mv" mc:PreserveAttributes="mv:*">
   <p:cSld>
     <p:spTree>
       <p:nvGrpSpPr>
@@ -14800,7 +14818,11 @@
           <a:p>
             <a:r>
               <a:rPr lang="en-US" dirty="0" smtClean="0"/>
-              <a:t>Josh – leaderboard design and implementation </a:t>
+              <a:t>Josh – leaderboard design with 3D interaction, </a:t>
+            </a:r>
+            <a:r>
+              <a:rPr lang="en-US" smtClean="0"/>
+              <a:t>virtual buttons</a:t>
             </a:r>
           </a:p>
           <a:p>
@@ -14812,11 +14834,7 @@
           <a:p>
             <a:r>
               <a:rPr lang="en-US" dirty="0" smtClean="0"/>
-              <a:t>Cassie, </a:t>
-            </a:r>
-            <a:r>
-              <a:rPr lang="en-US" dirty="0" smtClean="0"/>
-              <a:t>Kyle – Image targets, obstacles, flappy bird control</a:t>
+              <a:t>Cassie, Kyle – Image targets, obstacles, flappy bird control</a:t>
             </a:r>
             <a:endParaRPr lang="en-US" dirty="0"/>
           </a:p>
@@ -14848,7 +14866,7 @@
     </p:spTree>
     <p:extLst>
       <p:ext uri="{BB962C8B-B14F-4D97-AF65-F5344CB8AC3E}">
-        <p14:creationId xmlns:p14="http://schemas.microsoft.com/office/powerpoint/2010/main" val="2051766049"/>
+        <p14:creationId xmlns="" xmlns:a="http://schemas.openxmlformats.org/drawingml/2006/main" xmlns:r="http://schemas.openxmlformats.org/officeDocument/2006/relationships" xmlns:p="http://schemas.openxmlformats.org/presentationml/2006/main" xmlns:p14="http://schemas.microsoft.com/office/powerpoint/2010/main" xmlns:mv="urn:schemas-microsoft-com:mac:vml" xmlns:mc="http://schemas.openxmlformats.org/markup-compatibility/2006" val="2051766049"/>
       </p:ext>
     </p:extLst>
   </p:cSld>
@@ -14859,7 +14877,7 @@
 </file>
 
 <file path=ppt/slides/slide4.xml><?xml version="1.0" encoding="utf-8"?>
-<p:sld xmlns:a="http://schemas.openxmlformats.org/drawingml/2006/main" xmlns:r="http://schemas.openxmlformats.org/officeDocument/2006/relationships" xmlns:p="http://schemas.openxmlformats.org/presentationml/2006/main">
+<p:sld xmlns:a="http://schemas.openxmlformats.org/drawingml/2006/main" xmlns:r="http://schemas.openxmlformats.org/officeDocument/2006/relationships" xmlns:mc="http://schemas.openxmlformats.org/markup-compatibility/2006" xmlns:mv="urn:schemas-microsoft-com:mac:vml" xmlns:p="http://schemas.openxmlformats.org/presentationml/2006/main" mc:Ignorable="mv" mc:PreserveAttributes="mv:*">
   <p:cSld>
     <p:spTree>
       <p:nvGrpSpPr>
@@ -14900,7 +14918,6 @@
               <a:rPr lang="en-US" dirty="0" smtClean="0"/>
               <a:t>Flappy-bird control and movement </a:t>
             </a:r>
-            <a:endParaRPr lang="en-US" dirty="0" smtClean="0"/>
           </a:p>
           <a:p>
             <a:r>
@@ -14949,7 +14966,7 @@
     </p:spTree>
     <p:extLst>
       <p:ext uri="{BB962C8B-B14F-4D97-AF65-F5344CB8AC3E}">
-        <p14:creationId xmlns:p14="http://schemas.microsoft.com/office/powerpoint/2010/main" val="2729179641"/>
+        <p14:creationId xmlns="" xmlns:a="http://schemas.openxmlformats.org/drawingml/2006/main" xmlns:r="http://schemas.openxmlformats.org/officeDocument/2006/relationships" xmlns:p="http://schemas.openxmlformats.org/presentationml/2006/main" xmlns:p14="http://schemas.microsoft.com/office/powerpoint/2010/main" xmlns:mv="urn:schemas-microsoft-com:mac:vml" xmlns:mc="http://schemas.openxmlformats.org/markup-compatibility/2006" val="2729179641"/>
       </p:ext>
     </p:extLst>
   </p:cSld>
@@ -14960,7 +14977,7 @@
 </file>
 
 <file path=ppt/slides/slide5.xml><?xml version="1.0" encoding="utf-8"?>
-<p:sld xmlns:a="http://schemas.openxmlformats.org/drawingml/2006/main" xmlns:r="http://schemas.openxmlformats.org/officeDocument/2006/relationships" xmlns:p="http://schemas.openxmlformats.org/presentationml/2006/main">
+<p:sld xmlns:a="http://schemas.openxmlformats.org/drawingml/2006/main" xmlns:r="http://schemas.openxmlformats.org/officeDocument/2006/relationships" xmlns:mc="http://schemas.openxmlformats.org/markup-compatibility/2006" xmlns:mv="urn:schemas-microsoft-com:mac:vml" xmlns:p="http://schemas.openxmlformats.org/presentationml/2006/main" mc:Ignorable="mv" mc:PreserveAttributes="mv:*">
   <p:cSld>
     <p:spTree>
       <p:nvGrpSpPr>
@@ -15033,7 +15050,7 @@
     </p:spTree>
     <p:extLst>
       <p:ext uri="{BB962C8B-B14F-4D97-AF65-F5344CB8AC3E}">
-        <p14:creationId xmlns:p14="http://schemas.microsoft.com/office/powerpoint/2010/main" val="70100083"/>
+        <p14:creationId xmlns="" xmlns:a="http://schemas.openxmlformats.org/drawingml/2006/main" xmlns:r="http://schemas.openxmlformats.org/officeDocument/2006/relationships" xmlns:p="http://schemas.openxmlformats.org/presentationml/2006/main" xmlns:p14="http://schemas.microsoft.com/office/powerpoint/2010/main" xmlns:mv="urn:schemas-microsoft-com:mac:vml" xmlns:mc="http://schemas.openxmlformats.org/markup-compatibility/2006" val="70100083"/>
       </p:ext>
     </p:extLst>
   </p:cSld>

</xml_diff>